<commit_message>
Updating sizes of text boxes
</commit_message>
<xml_diff>
--- a/WebContent/WEB-INF/templates/GAB2019/master.pptx
+++ b/WebContent/WEB-INF/templates/GAB2019/master.pptx
@@ -151,7 +151,7 @@
   </p:defaultTextStyle>
   <p:extLst>
     <p:ext uri="{EFAFB233-063F-42B5-8137-9DF3F51BA10A}">
-      <p15:sldGuideLst xmlns:p15="http://schemas.microsoft.com/office/powerpoint/2012/main" xmlns=""/>
+      <p15:sldGuideLst xmlns="" xmlns:p15="http://schemas.microsoft.com/office/powerpoint/2012/main"/>
     </p:ext>
   </p:extLst>
 </p:presentation>
@@ -4184,15 +4184,6 @@
               </a:rPr>
               <a:t>Prayers for Global Peace and Purification</a:t>
             </a:r>
-            <a:endParaRPr lang="en" sz="1800" b="1" dirty="0">
-              <a:solidFill>
-                <a:srgbClr val="002060"/>
-              </a:solidFill>
-              <a:latin typeface="Corsiva"/>
-              <a:ea typeface="Corsiva"/>
-              <a:cs typeface="Corsiva"/>
-              <a:sym typeface="Corsiva"/>
-            </a:endParaRPr>
           </a:p>
         </p:txBody>
       </p:sp>
@@ -4260,8 +4251,8 @@
         </p:nvSpPr>
         <p:spPr bwMode="auto">
           <a:xfrm>
-            <a:off x="133351" y="2089151"/>
-            <a:ext cx="8901113" cy="1973263"/>
+            <a:off x="-18761" y="1282327"/>
+            <a:ext cx="9162761" cy="3244849"/>
           </a:xfrm>
           <a:prstGeom prst="rect">
             <a:avLst/>
@@ -4430,7 +4421,7 @@
               <a:buNone/>
             </a:pPr>
             <a:r>
-              <a:rPr lang="en-US" altLang="en-US" sz="2800">
+              <a:rPr lang="en-US" altLang="en-US" sz="2800" dirty="0" err="1">
                 <a:solidFill>
                   <a:srgbClr val="FFFFFF"/>
                 </a:solidFill>
@@ -4438,10 +4429,16 @@
               </a:rPr>
               <a:t>Bhajan</a:t>
             </a:r>
+            <a:endParaRPr lang="en-US" altLang="en-US" sz="2800" dirty="0">
+              <a:solidFill>
+                <a:srgbClr val="FFFFFF"/>
+              </a:solidFill>
+              <a:latin typeface="Calibri" charset="0"/>
+            </a:endParaRPr>
           </a:p>
           <a:p>
             <a:pPr eaLnBrk="1" hangingPunct="1"/>
-            <a:endParaRPr lang="en-US" altLang="en-US" sz="1600">
+            <a:endParaRPr lang="en-US" altLang="en-US" sz="1600" dirty="0">
               <a:latin typeface="Calibri" charset="0"/>
             </a:endParaRPr>
           </a:p>
@@ -4457,8 +4454,8 @@
         </p:nvSpPr>
         <p:spPr bwMode="auto">
           <a:xfrm>
-            <a:off x="482601" y="4603751"/>
-            <a:ext cx="8285163" cy="703263"/>
+            <a:off x="0" y="4603751"/>
+            <a:ext cx="9143999" cy="1118720"/>
           </a:xfrm>
           <a:prstGeom prst="rect">
             <a:avLst/>
@@ -6403,7 +6400,7 @@
   <a:extraClrSchemeLst/>
   <a:extLst>
     <a:ext uri="{05A4C25C-085E-4340-85A3-A5531E510DB2}">
-      <thm15:themeFamily xmlns:thm15="http://schemas.microsoft.com/office/thememl/2012/main" xmlns="" name="Office Theme" id="{62F939B6-93AF-4DB8-9C6B-D6C7DFDC589F}" vid="{4A3C46E8-61CC-4603-A589-7422A47A8E4A}"/>
+      <thm15:themeFamily xmlns="" xmlns:thm15="http://schemas.microsoft.com/office/thememl/2012/main" name="Office Theme" id="{62F939B6-93AF-4DB8-9C6B-D6C7DFDC589F}" vid="{4A3C46E8-61CC-4603-A589-7422A47A8E4A}"/>
     </a:ext>
   </a:extLst>
 </a:theme>

</xml_diff>